<commit_message>
updated slides from lecture
</commit_message>
<xml_diff>
--- a/Wi18_content/SEDS/L7.Testing.pptx
+++ b/Wi18_content/SEDS/L7.Testing.pptx
@@ -226,7 +226,7 @@
           <a:p>
             <a:fld id="{08F62E20-B1AA-3442-B8F1-F4A56998389D}" type="datetimeFigureOut">
               <a:rPr lang="en-US" smtClean="0"/>
-              <a:t>1/30/17</a:t>
+              <a:t>1/30/18</a:t>
             </a:fld>
             <a:endParaRPr lang="en-US"/>
           </a:p>
@@ -767,7 +767,7 @@
           <a:p>
             <a:fld id="{2691D6E4-0F7A-0249-86EF-226720E50E4C}" type="datetimeFigureOut">
               <a:rPr lang="en-US" smtClean="0"/>
-              <a:t>1/30/17</a:t>
+              <a:t>1/30/18</a:t>
             </a:fld>
             <a:endParaRPr lang="en-US"/>
           </a:p>
@@ -961,7 +961,7 @@
           <a:p>
             <a:fld id="{2691D6E4-0F7A-0249-86EF-226720E50E4C}" type="datetimeFigureOut">
               <a:rPr lang="en-US" smtClean="0"/>
-              <a:t>1/30/17</a:t>
+              <a:t>1/30/18</a:t>
             </a:fld>
             <a:endParaRPr lang="en-US"/>
           </a:p>
@@ -1165,7 +1165,7 @@
           <a:p>
             <a:fld id="{2691D6E4-0F7A-0249-86EF-226720E50E4C}" type="datetimeFigureOut">
               <a:rPr lang="en-US" smtClean="0"/>
-              <a:t>1/30/17</a:t>
+              <a:t>1/30/18</a:t>
             </a:fld>
             <a:endParaRPr lang="en-US"/>
           </a:p>
@@ -1359,7 +1359,7 @@
           <a:p>
             <a:fld id="{2691D6E4-0F7A-0249-86EF-226720E50E4C}" type="datetimeFigureOut">
               <a:rPr lang="en-US" smtClean="0"/>
-              <a:t>1/30/17</a:t>
+              <a:t>1/30/18</a:t>
             </a:fld>
             <a:endParaRPr lang="en-US"/>
           </a:p>
@@ -1629,7 +1629,7 @@
           <a:p>
             <a:fld id="{2691D6E4-0F7A-0249-86EF-226720E50E4C}" type="datetimeFigureOut">
               <a:rPr lang="en-US" smtClean="0"/>
-              <a:t>1/30/17</a:t>
+              <a:t>1/30/18</a:t>
             </a:fld>
             <a:endParaRPr lang="en-US"/>
           </a:p>
@@ -1941,7 +1941,7 @@
           <a:p>
             <a:fld id="{2691D6E4-0F7A-0249-86EF-226720E50E4C}" type="datetimeFigureOut">
               <a:rPr lang="en-US" smtClean="0"/>
-              <a:t>1/30/17</a:t>
+              <a:t>1/30/18</a:t>
             </a:fld>
             <a:endParaRPr lang="en-US"/>
           </a:p>
@@ -2387,7 +2387,7 @@
           <a:p>
             <a:fld id="{2691D6E4-0F7A-0249-86EF-226720E50E4C}" type="datetimeFigureOut">
               <a:rPr lang="en-US" smtClean="0"/>
-              <a:t>1/30/17</a:t>
+              <a:t>1/30/18</a:t>
             </a:fld>
             <a:endParaRPr lang="en-US"/>
           </a:p>
@@ -2529,7 +2529,7 @@
           <a:p>
             <a:fld id="{2691D6E4-0F7A-0249-86EF-226720E50E4C}" type="datetimeFigureOut">
               <a:rPr lang="en-US" smtClean="0"/>
-              <a:t>1/30/17</a:t>
+              <a:t>1/30/18</a:t>
             </a:fld>
             <a:endParaRPr lang="en-US"/>
           </a:p>
@@ -2648,7 +2648,7 @@
           <a:p>
             <a:fld id="{2691D6E4-0F7A-0249-86EF-226720E50E4C}" type="datetimeFigureOut">
               <a:rPr lang="en-US" smtClean="0"/>
-              <a:t>1/30/17</a:t>
+              <a:t>1/30/18</a:t>
             </a:fld>
             <a:endParaRPr lang="en-US"/>
           </a:p>
@@ -2949,7 +2949,7 @@
           <a:p>
             <a:fld id="{2691D6E4-0F7A-0249-86EF-226720E50E4C}" type="datetimeFigureOut">
               <a:rPr lang="en-US" smtClean="0"/>
-              <a:t>1/30/17</a:t>
+              <a:t>1/30/18</a:t>
             </a:fld>
             <a:endParaRPr lang="en-US"/>
           </a:p>
@@ -3226,7 +3226,7 @@
           <a:p>
             <a:fld id="{2691D6E4-0F7A-0249-86EF-226720E50E4C}" type="datetimeFigureOut">
               <a:rPr lang="en-US" smtClean="0"/>
-              <a:t>1/30/17</a:t>
+              <a:t>1/30/18</a:t>
             </a:fld>
             <a:endParaRPr lang="en-US"/>
           </a:p>
@@ -4385,26 +4385,16 @@
               <a:defRPr/>
             </a:pPr>
             <a:r>
+              <a:rPr lang="en-US" smtClean="0">
+                <a:latin typeface="Calibri" charset="0"/>
+              </a:rPr>
+              <a:t>Homework</a:t>
+            </a:r>
+            <a:r>
               <a:rPr lang="en-US" dirty="0" smtClean="0">
                 <a:latin typeface="Calibri" charset="0"/>
               </a:rPr>
-              <a:t>Thank you and a reminder!</a:t>
-            </a:r>
-          </a:p>
-          <a:p>
-            <a:pPr>
-              <a:spcBef>
-                <a:spcPts val="800"/>
-              </a:spcBef>
-              <a:buFont typeface="Arial" charset="0"/>
-              <a:buChar char="•"/>
-              <a:defRPr/>
-            </a:pPr>
-            <a:r>
-              <a:rPr lang="en-US" dirty="0" smtClean="0">
-                <a:latin typeface="Calibri" charset="0"/>
-              </a:rPr>
-              <a:t>Homework, questions?</a:t>
+              <a:t>, questions?</a:t>
             </a:r>
           </a:p>
           <a:p>
@@ -4536,6 +4526,13 @@
   <p:clrMapOvr>
     <a:masterClrMapping/>
   </p:clrMapOvr>
+  <p:timing>
+    <p:tnLst>
+      <p:par>
+        <p:cTn id="1" dur="indefinite" restart="never" nodeType="tmRoot"/>
+      </p:par>
+    </p:tnLst>
+  </p:timing>
 </p:sld>
 </file>
 

</xml_diff>